<commit_message>
edit magictrick.pptx  inc-exc.pptx, delete binomial-combinatorial.pptx
</commit_message>
<xml_diff>
--- a/spring12/slidesS12/magictrick.pptx
+++ b/spring12/slidesS12/magictrick.pptx
@@ -2830,11 +2830,7 @@
             </a:r>
             <a:r>
               <a:rPr lang="en-US" dirty="0" smtClean="0"/>
-              <a:t> </a:t>
-            </a:r>
-            <a:r>
-              <a:rPr lang="en-US" dirty="0" smtClean="0"/>
-              <a:t>10F.</a:t>
+              <a:t> 10F.</a:t>
             </a:r>
             <a:fld id="{CB2BD928-FA73-41E2-BD29-ED16D1EFD71C}" type="slidenum">
               <a:rPr lang="en-US" smtClean="0"/>
@@ -2984,11 +2980,7 @@
             </a:r>
             <a:r>
               <a:rPr lang="en-US" dirty="0" smtClean="0"/>
-              <a:t> </a:t>
-            </a:r>
-            <a:r>
-              <a:rPr lang="en-US" dirty="0" smtClean="0"/>
-              <a:t>10F.</a:t>
+              <a:t> 10F.</a:t>
             </a:r>
             <a:fld id="{D64AE0B5-FBC8-401C-9D58-7FCB6A8BDAB7}" type="slidenum">
               <a:rPr lang="en-US" smtClean="0"/>
@@ -3086,11 +3078,7 @@
             </a:r>
             <a:r>
               <a:rPr lang="en-US" dirty="0" smtClean="0"/>
-              <a:t> </a:t>
-            </a:r>
-            <a:r>
-              <a:rPr lang="en-US" dirty="0" smtClean="0"/>
-              <a:t>10F.</a:t>
+              <a:t> 10F.</a:t>
             </a:r>
             <a:fld id="{2B54D3A3-7076-4E41-BC8B-85C6A2A80614}" type="slidenum">
               <a:rPr lang="en-US" smtClean="0"/>
@@ -3168,11 +3156,7 @@
             </a:r>
             <a:r>
               <a:rPr lang="en-US" dirty="0" smtClean="0"/>
-              <a:t> </a:t>
-            </a:r>
-            <a:r>
-              <a:rPr lang="en-US" dirty="0" smtClean="0"/>
-              <a:t>10F.</a:t>
+              <a:t> 10F.</a:t>
             </a:r>
             <a:fld id="{9515C841-0140-49CE-8F2C-6959C7D70FD7}" type="slidenum">
               <a:rPr lang="en-US" smtClean="0"/>
@@ -3420,11 +3404,7 @@
             </a:r>
             <a:r>
               <a:rPr lang="en-US" dirty="0" smtClean="0"/>
-              <a:t> </a:t>
-            </a:r>
-            <a:r>
-              <a:rPr lang="en-US" dirty="0" smtClean="0"/>
-              <a:t>10F.</a:t>
+              <a:t> 10F.</a:t>
             </a:r>
             <a:fld id="{079D37AF-99FA-4D01-9518-1979F7715D44}" type="slidenum">
               <a:rPr lang="en-US" smtClean="0"/>
@@ -3488,22 +3468,7 @@
                 <a:uFillTx/>
                 <a:latin typeface="Comic Sans MS" pitchFamily="66" charset="0"/>
               </a:rPr>
-              <a:t>Albert R Meyer,          </a:t>
-            </a:r>
-            <a:r>
-              <a:rPr kumimoji="0" lang="en-US" sz="1200" b="0" i="0" u="none" strike="noStrike" kern="1200" cap="none" spc="0" normalizeH="0" baseline="0" noProof="0" dirty="0" smtClean="0">
-                <a:ln>
-                  <a:noFill/>
-                </a:ln>
-                <a:solidFill>
-                  <a:schemeClr val="tx1"/>
-                </a:solidFill>
-                <a:effectLst/>
-                <a:uLnTx/>
-                <a:uFillTx/>
-                <a:latin typeface="Comic Sans MS" pitchFamily="66" charset="0"/>
-              </a:rPr>
-              <a:t>April 20, 2012</a:t>
+              <a:t>Albert R Meyer,          April 20, 2012</a:t>
             </a:r>
             <a:endParaRPr kumimoji="0" lang="en-US" sz="1200" b="0" i="0" u="none" strike="noStrike" kern="1200" cap="none" spc="0" normalizeH="0" baseline="0" noProof="0" dirty="0">
               <a:ln>
@@ -4070,23 +4035,8 @@
                 </a:solidFill>
                 <a:latin typeface="Comic Sans MS" pitchFamily="66" charset="0"/>
               </a:rPr>
-              <a:t>A </a:t>
-            </a:r>
-            <a:r>
-              <a:rPr lang="en-US" sz="6600" b="1" dirty="0" smtClean="0">
-                <a:solidFill>
-                  <a:schemeClr val="tx2"/>
-                </a:solidFill>
-                <a:latin typeface="Comic Sans MS" pitchFamily="66" charset="0"/>
-              </a:rPr>
-              <a:t>Magic Trick</a:t>
-            </a:r>
-            <a:endParaRPr lang="en-US" sz="6600" b="1" dirty="0" smtClean="0">
-              <a:solidFill>
-                <a:schemeClr val="tx2"/>
-              </a:solidFill>
-              <a:latin typeface="Comic Sans MS" pitchFamily="66" charset="0"/>
-            </a:endParaRPr>
+              <a:t>A Magic Trick</a:t>
+            </a:r>
           </a:p>
         </p:txBody>
       </p:sp>
@@ -4113,11 +4063,7 @@
             </a:r>
             <a:r>
               <a:rPr lang="en-US" dirty="0" smtClean="0"/>
-              <a:t> </a:t>
-            </a:r>
-            <a:r>
-              <a:rPr lang="en-US" dirty="0" smtClean="0"/>
-              <a:t>10F.</a:t>
+              <a:t> 10F.</a:t>
             </a:r>
             <a:fld id="{73B57819-3F53-4064-ABEE-665935E0A2F0}" type="slidenum">
               <a:rPr lang="en-US" smtClean="0"/>
@@ -4346,11 +4292,7 @@
             </a:r>
             <a:r>
               <a:rPr lang="en-US" dirty="0" smtClean="0"/>
-              <a:t> </a:t>
-            </a:r>
-            <a:r>
-              <a:rPr lang="en-US" dirty="0" smtClean="0"/>
-              <a:t>10F.</a:t>
+              <a:t> 10F.</a:t>
             </a:r>
             <a:fld id="{B0FF02EB-D1D4-4FAF-AA08-3524FCCD24CB}" type="slidenum">
               <a:rPr lang="en-US" smtClean="0"/>
@@ -4567,7 +4509,7 @@
           <a:graphicData uri="http://schemas.openxmlformats.org/presentationml/2006/ole">
             <mc:AlternateContent xmlns:mc="http://schemas.openxmlformats.org/markup-compatibility/2006">
               <mc:Choice xmlns:v="urn:schemas-microsoft-com:vml" Requires="v">
-                <p:oleObj spid="_x0000_s137236" name="Equation" r:id="rId4" imgW="1257120" imgH="457200" progId="Equation.DSMT4">
+                <p:oleObj spid="_x0000_s137239" name="Equation" r:id="rId4" imgW="1257120" imgH="457200" progId="Equation.DSMT4">
                   <p:embed/>
                 </p:oleObj>
               </mc:Choice>
@@ -4789,11 +4731,7 @@
             </a:r>
             <a:r>
               <a:rPr lang="en-US" dirty="0" smtClean="0"/>
-              <a:t> </a:t>
-            </a:r>
-            <a:r>
-              <a:rPr lang="en-US" dirty="0" smtClean="0"/>
-              <a:t>10F.</a:t>
+              <a:t> 10F.</a:t>
             </a:r>
             <a:fld id="{4CFB4505-5DEB-491F-BE7C-4DE5D56D6CF5}" type="slidenum">
               <a:rPr lang="en-US" smtClean="0"/>
@@ -5321,11 +5259,7 @@
             </a:r>
             <a:r>
               <a:rPr lang="en-US" dirty="0" smtClean="0"/>
-              <a:t> </a:t>
-            </a:r>
-            <a:r>
-              <a:rPr lang="en-US" dirty="0" smtClean="0"/>
-              <a:t>10F.</a:t>
+              <a:t> 10F.</a:t>
             </a:r>
             <a:fld id="{6A7976DA-D173-4661-9B1A-1336E57E620A}" type="slidenum">
               <a:rPr lang="en-US" smtClean="0"/>
@@ -5893,11 +5827,7 @@
             </a:r>
             <a:r>
               <a:rPr lang="en-US" dirty="0" smtClean="0"/>
-              <a:t> </a:t>
-            </a:r>
-            <a:r>
-              <a:rPr lang="en-US" dirty="0" smtClean="0"/>
-              <a:t>10F.</a:t>
+              <a:t> 10F.</a:t>
             </a:r>
             <a:fld id="{6BD7755F-1779-4BC3-A62F-28E758764DAE}" type="slidenum">
               <a:rPr lang="en-US" smtClean="0"/>
@@ -6464,11 +6394,7 @@
             </a:r>
             <a:r>
               <a:rPr lang="en-US" dirty="0" smtClean="0"/>
-              <a:t> </a:t>
-            </a:r>
-            <a:r>
-              <a:rPr lang="en-US" dirty="0" smtClean="0"/>
-              <a:t>10F.</a:t>
+              <a:t> 10F.</a:t>
             </a:r>
             <a:fld id="{F569BDCB-22FD-4303-A204-DED67BB0A5D1}" type="slidenum">
               <a:rPr lang="en-US" smtClean="0"/>
@@ -6818,13 +6744,13 @@
               </a:lnSpc>
             </a:pPr>
             <a:r>
-              <a:rPr lang="en-US" sz="4400">
+              <a:rPr lang="en-US" sz="4400" dirty="0">
                 <a:latin typeface="Comic Sans MS" pitchFamily="66" charset="0"/>
               </a:rPr>
               <a:t>    </a:t>
             </a:r>
             <a:r>
-              <a:rPr lang="en-US" sz="5400">
+              <a:rPr lang="en-US" sz="5400" dirty="0">
                 <a:latin typeface="Comic Sans MS" pitchFamily="66" charset="0"/>
               </a:rPr>
               <a:t>Possible orders for the</a:t>
@@ -6837,7 +6763,7 @@
               </a:lnSpc>
             </a:pPr>
             <a:r>
-              <a:rPr lang="en-US" sz="5400">
+              <a:rPr lang="en-US" sz="5400" dirty="0">
                 <a:latin typeface="Comic Sans MS" pitchFamily="66" charset="0"/>
               </a:rPr>
               <a:t>    remaining 3 cards:</a:t>
@@ -6849,7 +6775,7 @@
                 <a:spcPct val="90000"/>
               </a:lnSpc>
             </a:pPr>
-            <a:endParaRPr lang="en-US" sz="4400">
+            <a:endParaRPr lang="en-US" sz="4400" dirty="0">
               <a:latin typeface="Comic Sans MS" pitchFamily="66" charset="0"/>
             </a:endParaRPr>
           </a:p>
@@ -6860,13 +6786,13 @@
               </a:lnSpc>
             </a:pPr>
             <a:r>
-              <a:rPr lang="en-US" sz="4000">
+              <a:rPr lang="en-US" sz="4000" dirty="0">
                 <a:latin typeface="Comic Sans MS" pitchFamily="66" charset="0"/>
               </a:rPr>
               <a:t>{ </a:t>
             </a:r>
             <a:r>
-              <a:rPr lang="en-US" sz="4000" b="1">
+              <a:rPr lang="en-US" sz="4000" b="1" dirty="0">
                 <a:solidFill>
                   <a:srgbClr val="0000FF"/>
                 </a:solidFill>
@@ -6875,7 +6801,7 @@
               <a:t>SML</a:t>
             </a:r>
             <a:r>
-              <a:rPr lang="en-US" sz="4000">
+              <a:rPr lang="en-US" sz="4000" dirty="0">
                 <a:solidFill>
                   <a:srgbClr val="0000FF"/>
                 </a:solidFill>
@@ -6884,7 +6810,7 @@
               <a:t>, </a:t>
             </a:r>
             <a:r>
-              <a:rPr lang="en-US" sz="4000" b="1">
+              <a:rPr lang="en-US" sz="4000" b="1" dirty="0">
                 <a:solidFill>
                   <a:srgbClr val="0000FF"/>
                 </a:solidFill>
@@ -6893,7 +6819,7 @@
               <a:t>SLM</a:t>
             </a:r>
             <a:r>
-              <a:rPr lang="en-US" sz="4000">
+              <a:rPr lang="en-US" sz="4000" dirty="0">
                 <a:solidFill>
                   <a:srgbClr val="0000FF"/>
                 </a:solidFill>
@@ -6902,7 +6828,7 @@
               <a:t>, </a:t>
             </a:r>
             <a:r>
-              <a:rPr lang="en-US" sz="4000" b="1">
+              <a:rPr lang="en-US" sz="4000" b="1" dirty="0">
                 <a:solidFill>
                   <a:srgbClr val="0000FF"/>
                 </a:solidFill>
@@ -6911,7 +6837,7 @@
               <a:t>MSL</a:t>
             </a:r>
             <a:r>
-              <a:rPr lang="en-US" sz="4000">
+              <a:rPr lang="en-US" sz="4000" dirty="0">
                 <a:solidFill>
                   <a:srgbClr val="0000FF"/>
                 </a:solidFill>
@@ -6920,7 +6846,7 @@
               <a:t>, </a:t>
             </a:r>
             <a:r>
-              <a:rPr lang="en-US" sz="4000" b="1">
+              <a:rPr lang="en-US" sz="4000" b="1" dirty="0">
                 <a:solidFill>
                   <a:srgbClr val="0000FF"/>
                 </a:solidFill>
@@ -6929,7 +6855,7 @@
               <a:t>MLS</a:t>
             </a:r>
             <a:r>
-              <a:rPr lang="en-US" sz="4000">
+              <a:rPr lang="en-US" sz="4000" dirty="0">
                 <a:solidFill>
                   <a:srgbClr val="0000FF"/>
                 </a:solidFill>
@@ -6938,7 +6864,7 @@
               <a:t>, </a:t>
             </a:r>
             <a:r>
-              <a:rPr lang="en-US" sz="4000" b="1">
+              <a:rPr lang="en-US" sz="4000" b="1" dirty="0">
                 <a:solidFill>
                   <a:srgbClr val="0000FF"/>
                 </a:solidFill>
@@ -6947,7 +6873,7 @@
               <a:t>LSM</a:t>
             </a:r>
             <a:r>
-              <a:rPr lang="en-US" sz="4000">
+              <a:rPr lang="en-US" sz="4000" dirty="0">
                 <a:solidFill>
                   <a:srgbClr val="0000FF"/>
                 </a:solidFill>
@@ -6956,7 +6882,7 @@
               <a:t>, </a:t>
             </a:r>
             <a:r>
-              <a:rPr lang="en-US" sz="4000" b="1">
+              <a:rPr lang="en-US" sz="4000" b="1" dirty="0">
                 <a:solidFill>
                   <a:srgbClr val="0000FF"/>
                 </a:solidFill>
@@ -6965,7 +6891,7 @@
               <a:t>LMS</a:t>
             </a:r>
             <a:r>
-              <a:rPr lang="en-US" sz="4000">
+              <a:rPr lang="en-US" sz="4000" dirty="0">
                 <a:latin typeface="Comic Sans MS" pitchFamily="66" charset="0"/>
               </a:rPr>
               <a:t> }</a:t>
@@ -6996,11 +6922,7 @@
             </a:r>
             <a:r>
               <a:rPr lang="en-US" dirty="0" smtClean="0"/>
-              <a:t> </a:t>
-            </a:r>
-            <a:r>
-              <a:rPr lang="en-US" dirty="0" smtClean="0"/>
-              <a:t>10F.</a:t>
+              <a:t> 10F.</a:t>
             </a:r>
             <a:fld id="{4DEFD96A-A3B1-44C5-9DCC-DF51A7BA84D6}" type="slidenum">
               <a:rPr lang="en-US" smtClean="0"/>
@@ -7040,7 +6962,7 @@
                             </p:stCondLst>
                             <p:childTnLst>
                               <p:par>
-                                <p:cTn id="5" presetID="1" presetClass="entr" presetSubtype="0" fill="hold" nodeType="clickEffect">
+                                <p:cTn id="5" presetID="22" presetClass="entr" presetSubtype="8" fill="hold" nodeType="clickEffect">
                                   <p:stCondLst>
                                     <p:cond delay="0"/>
                                   </p:stCondLst>
@@ -7067,6 +6989,18 @@
                                         <p:strVal val="visible"/>
                                       </p:to>
                                     </p:set>
+                                    <p:animEffect transition="in" filter="wipe(left)">
+                                      <p:cBhvr>
+                                        <p:cTn id="7" dur="1000"/>
+                                        <p:tgtEl>
+                                          <p:spTgt spid="463882">
+                                            <p:txEl>
+                                              <p:pRg st="3" end="3"/>
+                                            </p:txEl>
+                                          </p:spTgt>
+                                        </p:tgtEl>
+                                      </p:cBhvr>
+                                    </p:animEffect>
                                   </p:childTnLst>
                                 </p:cTn>
                               </p:par>
@@ -7457,11 +7391,7 @@
             </a:r>
             <a:r>
               <a:rPr lang="en-US" dirty="0" smtClean="0"/>
-              <a:t> </a:t>
-            </a:r>
-            <a:r>
-              <a:rPr lang="en-US" dirty="0" smtClean="0"/>
-              <a:t>10F.</a:t>
+              <a:t> 10F.</a:t>
             </a:r>
             <a:fld id="{D4CFA408-5106-45DE-A573-F23A99EB07A0}" type="slidenum">
               <a:rPr lang="en-US" smtClean="0"/>
@@ -9360,11 +9290,7 @@
             </a:r>
             <a:r>
               <a:rPr lang="en-US" dirty="0" smtClean="0"/>
-              <a:t> </a:t>
-            </a:r>
-            <a:r>
-              <a:rPr lang="en-US" dirty="0" smtClean="0"/>
-              <a:t>10F.</a:t>
+              <a:t> 10F.</a:t>
             </a:r>
             <a:fld id="{A97B727E-85D9-4D75-9F41-49236FB01EF8}" type="slidenum">
               <a:rPr lang="en-US" smtClean="0"/>
@@ -10344,11 +10270,7 @@
             </a:r>
             <a:r>
               <a:rPr lang="en-US" dirty="0" smtClean="0"/>
-              <a:t> </a:t>
-            </a:r>
-            <a:r>
-              <a:rPr lang="en-US" dirty="0" smtClean="0"/>
-              <a:t>10F.</a:t>
+              <a:t> 10F.</a:t>
             </a:r>
             <a:fld id="{667473EA-F42D-4AA1-82FF-930CBD07F711}" type="slidenum">
               <a:rPr lang="en-US" smtClean="0"/>
@@ -11535,7 +11457,7 @@
           <a:graphicData uri="http://schemas.openxmlformats.org/presentationml/2006/ole">
             <mc:AlternateContent xmlns:mc="http://schemas.openxmlformats.org/markup-compatibility/2006">
               <mc:Choice xmlns:v="urn:schemas-microsoft-com:vml" Requires="v">
-                <p:oleObj spid="_x0000_s153620" name="Equation" r:id="rId9" imgW="508000" imgH="406400" progId="Equation.DSMT4">
+                <p:oleObj spid="_x0000_s153623" name="Equation" r:id="rId9" imgW="508000" imgH="406400" progId="Equation.DSMT4">
                   <p:embed/>
                 </p:oleObj>
               </mc:Choice>
@@ -11991,11 +11913,7 @@
             </a:r>
             <a:r>
               <a:rPr lang="en-US" dirty="0" smtClean="0"/>
-              <a:t> </a:t>
-            </a:r>
-            <a:r>
-              <a:rPr lang="en-US" dirty="0" smtClean="0"/>
-              <a:t>10F.</a:t>
+              <a:t> 10F.</a:t>
             </a:r>
             <a:fld id="{53DBC806-5CDC-4452-B203-0326A7A2319F}" type="slidenum">
               <a:rPr lang="en-US" smtClean="0"/>
@@ -12011,6 +11929,18 @@
   <p:clrMapOvr>
     <a:masterClrMapping/>
   </p:clrMapOvr>
+  <mc:AlternateContent xmlns:mc="http://schemas.openxmlformats.org/markup-compatibility/2006">
+    <mc:Choice xmlns:p14="http://schemas.microsoft.com/office/powerpoint/2010/main" Requires="p14">
+      <p:transition spd="slow" p14:dur="800">
+        <p:fade thruBlk="1"/>
+      </p:transition>
+    </mc:Choice>
+    <mc:Fallback>
+      <p:transition xmlns:p14="http://schemas.microsoft.com/office/powerpoint/2010/main" spd="slow">
+        <p:fade thruBlk="1"/>
+      </p:transition>
+    </mc:Fallback>
+  </mc:AlternateContent>
   <p:timing>
     <p:tnLst>
       <p:par>
@@ -12032,7 +11962,7 @@
                             </p:stCondLst>
                             <p:childTnLst>
                               <p:par>
-                                <p:cTn id="5" presetID="1" presetClass="entr" presetSubtype="0" fill="hold" nodeType="clickEffect">
+                                <p:cTn id="5" presetID="22" presetClass="entr" presetSubtype="4" fill="hold" nodeType="clickEffect">
                                   <p:stCondLst>
                                     <p:cond delay="0"/>
                                   </p:stCondLst>
@@ -12055,6 +11985,14 @@
                                         <p:strVal val="visible"/>
                                       </p:to>
                                     </p:set>
+                                    <p:animEffect transition="in" filter="wipe(down)">
+                                      <p:cBhvr>
+                                        <p:cTn id="7" dur="500"/>
+                                        <p:tgtEl>
+                                          <p:spTgt spid="612352"/>
+                                        </p:tgtEl>
+                                      </p:cBhvr>
+                                    </p:animEffect>
                                   </p:childTnLst>
                                 </p:cTn>
                               </p:par>
@@ -12065,26 +12003,26 @@
                     </p:cTn>
                   </p:par>
                   <p:par>
-                    <p:cTn id="7" fill="hold">
+                    <p:cTn id="8" fill="hold">
                       <p:stCondLst>
                         <p:cond delay="indefinite"/>
                       </p:stCondLst>
                       <p:childTnLst>
                         <p:par>
-                          <p:cTn id="8" fill="hold">
+                          <p:cTn id="9" fill="hold">
                             <p:stCondLst>
                               <p:cond delay="0"/>
                             </p:stCondLst>
                             <p:childTnLst>
                               <p:par>
-                                <p:cTn id="9" presetID="1" presetClass="entr" presetSubtype="0" fill="hold" nodeType="clickEffect">
+                                <p:cTn id="10" presetID="9" presetClass="entr" presetSubtype="0" fill="hold" nodeType="clickEffect">
                                   <p:stCondLst>
                                     <p:cond delay="0"/>
                                   </p:stCondLst>
                                   <p:childTnLst>
                                     <p:set>
                                       <p:cBhvr>
-                                        <p:cTn id="10" dur="1" fill="hold">
+                                        <p:cTn id="11" dur="1" fill="hold">
                                           <p:stCondLst>
                                             <p:cond delay="0"/>
                                           </p:stCondLst>
@@ -12100,6 +12038,14 @@
                                         <p:strVal val="visible"/>
                                       </p:to>
                                     </p:set>
+                                    <p:animEffect transition="in" filter="dissolve">
+                                      <p:cBhvr>
+                                        <p:cTn id="12" dur="500"/>
+                                        <p:tgtEl>
+                                          <p:spTgt spid="8"/>
+                                        </p:tgtEl>
+                                      </p:cBhvr>
+                                    </p:animEffect>
                                   </p:childTnLst>
                                 </p:cTn>
                               </p:par>
@@ -12110,26 +12056,26 @@
                     </p:cTn>
                   </p:par>
                   <p:par>
-                    <p:cTn id="11" fill="hold">
+                    <p:cTn id="13" fill="hold">
                       <p:stCondLst>
                         <p:cond delay="indefinite"/>
                       </p:stCondLst>
                       <p:childTnLst>
                         <p:par>
-                          <p:cTn id="12" fill="hold">
+                          <p:cTn id="14" fill="hold">
                             <p:stCondLst>
                               <p:cond delay="0"/>
                             </p:stCondLst>
                             <p:childTnLst>
                               <p:par>
-                                <p:cTn id="13" presetID="1" presetClass="entr" presetSubtype="0" fill="hold" nodeType="clickEffect">
+                                <p:cTn id="15" presetID="9" presetClass="entr" presetSubtype="0" fill="hold" nodeType="clickEffect">
                                   <p:stCondLst>
                                     <p:cond delay="0"/>
                                   </p:stCondLst>
                                   <p:childTnLst>
                                     <p:set>
                                       <p:cBhvr>
-                                        <p:cTn id="14" dur="1" fill="hold">
+                                        <p:cTn id="16" dur="1" fill="hold">
                                           <p:stCondLst>
                                             <p:cond delay="0"/>
                                           </p:stCondLst>
@@ -12145,6 +12091,14 @@
                                         <p:strVal val="visible"/>
                                       </p:to>
                                     </p:set>
+                                    <p:animEffect transition="in" filter="dissolve">
+                                      <p:cBhvr>
+                                        <p:cTn id="17" dur="500"/>
+                                        <p:tgtEl>
+                                          <p:spTgt spid="6"/>
+                                        </p:tgtEl>
+                                      </p:cBhvr>
+                                    </p:animEffect>
                                   </p:childTnLst>
                                 </p:cTn>
                               </p:par>
@@ -12155,26 +12109,26 @@
                     </p:cTn>
                   </p:par>
                   <p:par>
-                    <p:cTn id="15" fill="hold">
+                    <p:cTn id="18" fill="hold">
                       <p:stCondLst>
                         <p:cond delay="indefinite"/>
                       </p:stCondLst>
                       <p:childTnLst>
                         <p:par>
-                          <p:cTn id="16" fill="hold">
+                          <p:cTn id="19" fill="hold">
                             <p:stCondLst>
                               <p:cond delay="0"/>
                             </p:stCondLst>
                             <p:childTnLst>
                               <p:par>
-                                <p:cTn id="17" presetID="1" presetClass="entr" presetSubtype="0" fill="hold" grpId="0" nodeType="clickEffect">
+                                <p:cTn id="20" presetID="22" presetClass="entr" presetSubtype="8" fill="hold" grpId="0" nodeType="clickEffect">
                                   <p:stCondLst>
                                     <p:cond delay="0"/>
                                   </p:stCondLst>
                                   <p:childTnLst>
                                     <p:set>
                                       <p:cBhvr>
-                                        <p:cTn id="18" dur="1" fill="hold">
+                                        <p:cTn id="21" dur="1" fill="hold">
                                           <p:stCondLst>
                                             <p:cond delay="0"/>
                                           </p:stCondLst>
@@ -12190,6 +12144,14 @@
                                         <p:strVal val="visible"/>
                                       </p:to>
                                     </p:set>
+                                    <p:animEffect transition="in" filter="wipe(left)">
+                                      <p:cBhvr>
+                                        <p:cTn id="22" dur="500"/>
+                                        <p:tgtEl>
+                                          <p:spTgt spid="469011"/>
+                                        </p:tgtEl>
+                                      </p:cBhvr>
+                                    </p:animEffect>
                                   </p:childTnLst>
                                 </p:cTn>
                               </p:par>
@@ -12200,26 +12162,26 @@
                     </p:cTn>
                   </p:par>
                   <p:par>
-                    <p:cTn id="19" fill="hold">
+                    <p:cTn id="23" fill="hold">
                       <p:stCondLst>
                         <p:cond delay="indefinite"/>
                       </p:stCondLst>
                       <p:childTnLst>
                         <p:par>
-                          <p:cTn id="20" fill="hold">
+                          <p:cTn id="24" fill="hold">
                             <p:stCondLst>
                               <p:cond delay="0"/>
                             </p:stCondLst>
                             <p:childTnLst>
                               <p:par>
-                                <p:cTn id="21" presetID="1" presetClass="entr" presetSubtype="0" fill="hold" nodeType="clickEffect">
+                                <p:cTn id="25" presetID="22" presetClass="entr" presetSubtype="8" fill="hold" nodeType="clickEffect">
                                   <p:stCondLst>
                                     <p:cond delay="0"/>
                                   </p:stCondLst>
                                   <p:childTnLst>
                                     <p:set>
                                       <p:cBhvr>
-                                        <p:cTn id="22" dur="1" fill="hold">
+                                        <p:cTn id="26" dur="1" fill="hold">
                                           <p:stCondLst>
                                             <p:cond delay="0"/>
                                           </p:stCondLst>
@@ -12235,6 +12197,14 @@
                                         <p:strVal val="visible"/>
                                       </p:to>
                                     </p:set>
+                                    <p:animEffect transition="in" filter="wipe(left)">
+                                      <p:cBhvr>
+                                        <p:cTn id="27" dur="500"/>
+                                        <p:tgtEl>
+                                          <p:spTgt spid="10"/>
+                                        </p:tgtEl>
+                                      </p:cBhvr>
+                                    </p:animEffect>
                                   </p:childTnLst>
                                 </p:cTn>
                               </p:par>
@@ -12469,11 +12439,7 @@
             </a:r>
             <a:r>
               <a:rPr lang="en-US" dirty="0" smtClean="0"/>
-              <a:t> </a:t>
-            </a:r>
-            <a:r>
-              <a:rPr lang="en-US" dirty="0" smtClean="0"/>
-              <a:t>10F.</a:t>
+              <a:t> 10F.</a:t>
             </a:r>
             <a:fld id="{B427E22D-7E6D-4DBA-A517-83D4E9B7D2C2}" type="slidenum">
               <a:rPr lang="en-US" smtClean="0"/>
@@ -12699,7 +12665,7 @@
           <a:graphicData uri="http://schemas.openxmlformats.org/presentationml/2006/ole">
             <mc:AlternateContent xmlns:mc="http://schemas.openxmlformats.org/markup-compatibility/2006">
               <mc:Choice xmlns:v="urn:schemas-microsoft-com:vml" Requires="v">
-                <p:oleObj spid="_x0000_s155680" name="Equation" r:id="rId4" imgW="1002960" imgH="406080" progId="Equation.DSMT4">
+                <p:oleObj spid="_x0000_s155685" name="Equation" r:id="rId4" imgW="1002960" imgH="406080" progId="Equation.DSMT4">
                   <p:embed/>
                 </p:oleObj>
               </mc:Choice>
@@ -12828,7 +12794,7 @@
           <a:graphicData uri="http://schemas.openxmlformats.org/presentationml/2006/ole">
             <mc:AlternateContent xmlns:mc="http://schemas.openxmlformats.org/markup-compatibility/2006">
               <mc:Choice xmlns:v="urn:schemas-microsoft-com:vml" Requires="v">
-                <p:oleObj spid="_x0000_s155681" name="Equation" r:id="rId6" imgW="1104840" imgH="457200" progId="Equation.DSMT4">
+                <p:oleObj spid="_x0000_s155686" name="Equation" r:id="rId6" imgW="1104840" imgH="457200" progId="Equation.DSMT4">
                   <p:embed/>
                 </p:oleObj>
               </mc:Choice>
@@ -13125,11 +13091,7 @@
             </a:r>
             <a:r>
               <a:rPr lang="en-US" dirty="0" smtClean="0"/>
-              <a:t> </a:t>
-            </a:r>
-            <a:r>
-              <a:rPr lang="en-US" dirty="0" smtClean="0"/>
-              <a:t>10F.</a:t>
+              <a:t> 10F.</a:t>
             </a:r>
             <a:fld id="{A7BAA29C-9724-4A4B-80F5-1E7A18906EA2}" type="slidenum">
               <a:rPr lang="en-US" smtClean="0"/>
@@ -13169,7 +13131,7 @@
                             </p:stCondLst>
                             <p:childTnLst>
                               <p:par>
-                                <p:cTn id="5" presetID="1" presetClass="entr" presetSubtype="0" fill="hold" grpId="0" nodeType="clickEffect">
+                                <p:cTn id="5" presetID="9" presetClass="entr" presetSubtype="0" fill="hold" grpId="0" nodeType="clickEffect">
                                   <p:stCondLst>
                                     <p:cond delay="0"/>
                                   </p:stCondLst>
@@ -13192,18 +13154,26 @@
                                         <p:strVal val="visible"/>
                                       </p:to>
                                     </p:set>
+                                    <p:animEffect transition="in" filter="dissolve">
+                                      <p:cBhvr>
+                                        <p:cTn id="7" dur="500"/>
+                                        <p:tgtEl>
+                                          <p:spTgt spid="435211"/>
+                                        </p:tgtEl>
+                                      </p:cBhvr>
+                                    </p:animEffect>
                                   </p:childTnLst>
                                 </p:cTn>
                               </p:par>
                               <p:par>
-                                <p:cTn id="7" presetID="1" presetClass="entr" presetSubtype="0" fill="hold" grpId="0" nodeType="withEffect">
+                                <p:cTn id="8" presetID="9" presetClass="entr" presetSubtype="0" fill="hold" grpId="0" nodeType="withEffect">
                                   <p:stCondLst>
                                     <p:cond delay="0"/>
                                   </p:stCondLst>
                                   <p:childTnLst>
                                     <p:set>
                                       <p:cBhvr>
-                                        <p:cTn id="8" dur="1" fill="hold">
+                                        <p:cTn id="9" dur="1" fill="hold">
                                           <p:stCondLst>
                                             <p:cond delay="0"/>
                                           </p:stCondLst>
@@ -13219,18 +13189,26 @@
                                         <p:strVal val="visible"/>
                                       </p:to>
                                     </p:set>
+                                    <p:animEffect transition="in" filter="dissolve">
+                                      <p:cBhvr>
+                                        <p:cTn id="10" dur="500"/>
+                                        <p:tgtEl>
+                                          <p:spTgt spid="435229"/>
+                                        </p:tgtEl>
+                                      </p:cBhvr>
+                                    </p:animEffect>
                                   </p:childTnLst>
                                 </p:cTn>
                               </p:par>
                               <p:par>
-                                <p:cTn id="9" presetID="1" presetClass="entr" presetSubtype="0" fill="hold" nodeType="withEffect">
+                                <p:cTn id="11" presetID="9" presetClass="entr" presetSubtype="0" fill="hold" nodeType="withEffect">
                                   <p:stCondLst>
                                     <p:cond delay="0"/>
                                   </p:stCondLst>
                                   <p:childTnLst>
                                     <p:set>
                                       <p:cBhvr>
-                                        <p:cTn id="10" dur="1" fill="hold">
+                                        <p:cTn id="12" dur="1" fill="hold">
                                           <p:stCondLst>
                                             <p:cond delay="0"/>
                                           </p:stCondLst>
@@ -13246,18 +13224,26 @@
                                         <p:strVal val="visible"/>
                                       </p:to>
                                     </p:set>
+                                    <p:animEffect transition="in" filter="dissolve">
+                                      <p:cBhvr>
+                                        <p:cTn id="13" dur="500"/>
+                                        <p:tgtEl>
+                                          <p:spTgt spid="613377"/>
+                                        </p:tgtEl>
+                                      </p:cBhvr>
+                                    </p:animEffect>
                                   </p:childTnLst>
                                 </p:cTn>
                               </p:par>
                               <p:par>
-                                <p:cTn id="11" presetID="1" presetClass="entr" presetSubtype="0" fill="hold" grpId="0" nodeType="withEffect">
+                                <p:cTn id="14" presetID="9" presetClass="entr" presetSubtype="0" fill="hold" grpId="0" nodeType="withEffect">
                                   <p:stCondLst>
                                     <p:cond delay="0"/>
                                   </p:stCondLst>
                                   <p:childTnLst>
                                     <p:set>
                                       <p:cBhvr>
-                                        <p:cTn id="12" dur="1" fill="hold">
+                                        <p:cTn id="15" dur="1" fill="hold">
                                           <p:stCondLst>
                                             <p:cond delay="0"/>
                                           </p:stCondLst>
@@ -13273,6 +13259,14 @@
                                         <p:strVal val="visible"/>
                                       </p:to>
                                     </p:set>
+                                    <p:animEffect transition="in" filter="dissolve">
+                                      <p:cBhvr>
+                                        <p:cTn id="16" dur="500"/>
+                                        <p:tgtEl>
+                                          <p:spTgt spid="435227"/>
+                                        </p:tgtEl>
+                                      </p:cBhvr>
+                                    </p:animEffect>
                                   </p:childTnLst>
                                 </p:cTn>
                               </p:par>
@@ -13283,26 +13277,26 @@
                     </p:cTn>
                   </p:par>
                   <p:par>
-                    <p:cTn id="13" fill="hold">
+                    <p:cTn id="17" fill="hold">
                       <p:stCondLst>
                         <p:cond delay="indefinite"/>
                       </p:stCondLst>
                       <p:childTnLst>
                         <p:par>
-                          <p:cTn id="14" fill="hold">
+                          <p:cTn id="18" fill="hold">
                             <p:stCondLst>
                               <p:cond delay="0"/>
                             </p:stCondLst>
                             <p:childTnLst>
                               <p:par>
-                                <p:cTn id="15" presetID="1" presetClass="entr" presetSubtype="0" fill="hold" grpId="0" nodeType="clickEffect">
+                                <p:cTn id="19" presetID="9" presetClass="entr" presetSubtype="0" fill="hold" grpId="0" nodeType="clickEffect">
                                   <p:stCondLst>
                                     <p:cond delay="0"/>
                                   </p:stCondLst>
                                   <p:childTnLst>
                                     <p:set>
                                       <p:cBhvr>
-                                        <p:cTn id="16" dur="1" fill="hold">
+                                        <p:cTn id="20" dur="1" fill="hold">
                                           <p:stCondLst>
                                             <p:cond delay="0"/>
                                           </p:stCondLst>
@@ -13318,18 +13312,26 @@
                                         <p:strVal val="visible"/>
                                       </p:to>
                                     </p:set>
+                                    <p:animEffect transition="in" filter="dissolve">
+                                      <p:cBhvr>
+                                        <p:cTn id="21" dur="500"/>
+                                        <p:tgtEl>
+                                          <p:spTgt spid="435210"/>
+                                        </p:tgtEl>
+                                      </p:cBhvr>
+                                    </p:animEffect>
                                   </p:childTnLst>
                                 </p:cTn>
                               </p:par>
                               <p:par>
-                                <p:cTn id="17" presetID="1" presetClass="entr" presetSubtype="0" fill="hold" nodeType="withEffect">
+                                <p:cTn id="22" presetID="9" presetClass="entr" presetSubtype="0" fill="hold" nodeType="withEffect">
                                   <p:stCondLst>
                                     <p:cond delay="0"/>
                                   </p:stCondLst>
                                   <p:childTnLst>
                                     <p:set>
                                       <p:cBhvr>
-                                        <p:cTn id="18" dur="1" fill="hold">
+                                        <p:cTn id="23" dur="1" fill="hold">
                                           <p:stCondLst>
                                             <p:cond delay="0"/>
                                           </p:stCondLst>
@@ -13345,18 +13347,26 @@
                                         <p:strVal val="visible"/>
                                       </p:to>
                                     </p:set>
+                                    <p:animEffect transition="in" filter="dissolve">
+                                      <p:cBhvr>
+                                        <p:cTn id="24" dur="500"/>
+                                        <p:tgtEl>
+                                          <p:spTgt spid="613376"/>
+                                        </p:tgtEl>
+                                      </p:cBhvr>
+                                    </p:animEffect>
                                   </p:childTnLst>
                                 </p:cTn>
                               </p:par>
                               <p:par>
-                                <p:cTn id="19" presetID="1" presetClass="entr" presetSubtype="0" fill="hold" grpId="0" nodeType="withEffect">
+                                <p:cTn id="25" presetID="9" presetClass="entr" presetSubtype="0" fill="hold" grpId="0" nodeType="withEffect">
                                   <p:stCondLst>
                                     <p:cond delay="0"/>
                                   </p:stCondLst>
                                   <p:childTnLst>
                                     <p:set>
                                       <p:cBhvr>
-                                        <p:cTn id="20" dur="1" fill="hold">
+                                        <p:cTn id="26" dur="1" fill="hold">
                                           <p:stCondLst>
                                             <p:cond delay="0"/>
                                           </p:stCondLst>
@@ -13372,6 +13382,14 @@
                                         <p:strVal val="visible"/>
                                       </p:to>
                                     </p:set>
+                                    <p:animEffect transition="in" filter="dissolve">
+                                      <p:cBhvr>
+                                        <p:cTn id="27" dur="500"/>
+                                        <p:tgtEl>
+                                          <p:spTgt spid="435228"/>
+                                        </p:tgtEl>
+                                      </p:cBhvr>
+                                    </p:animEffect>
                                   </p:childTnLst>
                                 </p:cTn>
                               </p:par>
@@ -13631,7 +13649,7 @@
           <a:graphicData uri="http://schemas.openxmlformats.org/presentationml/2006/ole">
             <mc:AlternateContent xmlns:mc="http://schemas.openxmlformats.org/markup-compatibility/2006">
               <mc:Choice xmlns:v="urn:schemas-microsoft-com:vml" Requires="v">
-                <p:oleObj spid="_x0000_s157716" name="Equation" r:id="rId4" imgW="1028700" imgH="482600" progId="Equation.DSMT4">
+                <p:oleObj spid="_x0000_s157719" name="Equation" r:id="rId4" imgW="1028700" imgH="482600" progId="Equation.DSMT4">
                   <p:embed/>
                 </p:oleObj>
               </mc:Choice>
@@ -13708,11 +13726,7 @@
             </a:r>
             <a:r>
               <a:rPr lang="en-US" dirty="0" smtClean="0"/>
-              <a:t> </a:t>
-            </a:r>
-            <a:r>
-              <a:rPr lang="en-US" dirty="0" smtClean="0"/>
-              <a:t>10F.</a:t>
+              <a:t> 10F.</a:t>
             </a:r>
             <a:fld id="{312EA255-FF37-4875-AE59-239BFBDC82D5}" type="slidenum">
               <a:rPr lang="en-US" smtClean="0"/>
@@ -13752,7 +13766,7 @@
                             </p:stCondLst>
                             <p:childTnLst>
                               <p:par>
-                                <p:cTn id="5" presetID="1" presetClass="entr" presetSubtype="0" fill="hold" nodeType="clickEffect">
+                                <p:cTn id="5" presetID="9" presetClass="entr" presetSubtype="0" fill="hold" nodeType="clickEffect">
                                   <p:stCondLst>
                                     <p:cond delay="0"/>
                                   </p:stCondLst>
@@ -13779,6 +13793,18 @@
                                         <p:strVal val="visible"/>
                                       </p:to>
                                     </p:set>
+                                    <p:animEffect transition="in" filter="dissolve">
+                                      <p:cBhvr>
+                                        <p:cTn id="7" dur="500"/>
+                                        <p:tgtEl>
+                                          <p:spTgt spid="558087">
+                                            <p:txEl>
+                                              <p:pRg st="1" end="1"/>
+                                            </p:txEl>
+                                          </p:spTgt>
+                                        </p:tgtEl>
+                                      </p:cBhvr>
+                                    </p:animEffect>
                                   </p:childTnLst>
                                 </p:cTn>
                               </p:par>
@@ -13916,11 +13942,7 @@
             </a:r>
             <a:r>
               <a:rPr lang="en-US" dirty="0" smtClean="0"/>
-              <a:t> </a:t>
-            </a:r>
-            <a:r>
-              <a:rPr lang="en-US" dirty="0" smtClean="0"/>
-              <a:t>10F.</a:t>
+              <a:t> 10F.</a:t>
             </a:r>
             <a:fld id="{8ED4FA4E-F318-4D4A-92AF-ADBE4E4006AD}" type="slidenum">
               <a:rPr lang="en-US" smtClean="0"/>
@@ -14138,11 +14160,7 @@
             </a:r>
             <a:r>
               <a:rPr lang="en-US" dirty="0" smtClean="0"/>
-              <a:t> </a:t>
-            </a:r>
-            <a:r>
-              <a:rPr lang="en-US" dirty="0" smtClean="0"/>
-              <a:t>10F.</a:t>
+              <a:t> 10F.</a:t>
             </a:r>
             <a:fld id="{CF6C6ACF-554E-4571-91F7-53727E6D932A}" type="slidenum">
               <a:rPr lang="en-US" smtClean="0"/>
@@ -16932,11 +16950,7 @@
             </a:r>
             <a:r>
               <a:rPr lang="en-US" dirty="0" smtClean="0"/>
-              <a:t> </a:t>
-            </a:r>
-            <a:r>
-              <a:rPr lang="en-US" dirty="0" smtClean="0"/>
-              <a:t>10F.</a:t>
+              <a:t> 10F.</a:t>
             </a:r>
             <a:fld id="{BC0728D2-3EB1-419D-96B7-3DC9770C9B97}" type="slidenum">
               <a:rPr lang="en-US" smtClean="0"/>
@@ -20945,11 +20959,7 @@
             </a:r>
             <a:r>
               <a:rPr lang="en-US" dirty="0" smtClean="0"/>
-              <a:t> </a:t>
-            </a:r>
-            <a:r>
-              <a:rPr lang="en-US" dirty="0" smtClean="0"/>
-              <a:t>10F.</a:t>
+              <a:t> 10F.</a:t>
             </a:r>
             <a:fld id="{2095F3C2-642C-4FC4-8AB0-615EB7B31C2B}" type="slidenum">
               <a:rPr lang="en-US" smtClean="0"/>
@@ -22204,11 +22214,7 @@
             </a:r>
             <a:r>
               <a:rPr lang="en-US" dirty="0" smtClean="0"/>
-              <a:t> </a:t>
-            </a:r>
-            <a:r>
-              <a:rPr lang="en-US" dirty="0" smtClean="0"/>
-              <a:t>10F.</a:t>
+              <a:t> 10F.</a:t>
             </a:r>
             <a:fld id="{F73B5DA3-1AC0-438F-B9CB-5F198C9AF33E}" type="slidenum">
               <a:rPr lang="en-US" smtClean="0"/>
@@ -23721,11 +23727,7 @@
             </a:r>
             <a:r>
               <a:rPr lang="en-US" dirty="0" smtClean="0"/>
-              <a:t> </a:t>
-            </a:r>
-            <a:r>
-              <a:rPr lang="en-US" dirty="0" smtClean="0"/>
-              <a:t>10F.</a:t>
+              <a:t> 10F.</a:t>
             </a:r>
             <a:fld id="{A774967B-D519-47FD-BF5E-4563B7BD084C}" type="slidenum">
               <a:rPr lang="en-US" smtClean="0"/>
@@ -24477,7 +24479,7 @@
           <a:graphicData uri="http://schemas.openxmlformats.org/presentationml/2006/ole">
             <mc:AlternateContent xmlns:mc="http://schemas.openxmlformats.org/markup-compatibility/2006">
               <mc:Choice xmlns:v="urn:schemas-microsoft-com:vml" Requires="v">
-                <p:oleObj spid="_x0000_s133140" name="Equation" r:id="rId9" imgW="1397000" imgH="228600" progId="Equation.DSMT4">
+                <p:oleObj spid="_x0000_s133143" name="Equation" r:id="rId9" imgW="1397000" imgH="228600" progId="Equation.DSMT4">
                   <p:embed/>
                 </p:oleObj>
               </mc:Choice>
@@ -25119,11 +25121,7 @@
             </a:r>
             <a:r>
               <a:rPr lang="en-US" dirty="0" smtClean="0"/>
-              <a:t> </a:t>
-            </a:r>
-            <a:r>
-              <a:rPr lang="en-US" dirty="0" smtClean="0"/>
-              <a:t>10F.</a:t>
+              <a:t> 10F.</a:t>
             </a:r>
             <a:fld id="{8ECF142E-936D-483D-BFC6-A4BC4E02572F}" type="slidenum">
               <a:rPr lang="en-US" smtClean="0"/>

</xml_diff>